<commit_message>
add neural decision tree
</commit_message>
<xml_diff>
--- a/fedod_overview.pptx
+++ b/fedod_overview.pptx
@@ -243,7 +243,7 @@
           <a:p>
             <a:fld id="{8A2BB69E-2060-441C-AF3E-3E70B44CC4DA}" type="datetimeFigureOut">
               <a:rPr lang="en-US" smtClean="0"/>
-              <a:t>4/5/2022</a:t>
+              <a:t>4/10/2022</a:t>
             </a:fld>
             <a:endParaRPr lang="en-US"/>
           </a:p>
@@ -413,7 +413,7 @@
           <a:p>
             <a:fld id="{8A2BB69E-2060-441C-AF3E-3E70B44CC4DA}" type="datetimeFigureOut">
               <a:rPr lang="en-US" smtClean="0"/>
-              <a:t>4/5/2022</a:t>
+              <a:t>4/10/2022</a:t>
             </a:fld>
             <a:endParaRPr lang="en-US"/>
           </a:p>
@@ -593,7 +593,7 @@
           <a:p>
             <a:fld id="{8A2BB69E-2060-441C-AF3E-3E70B44CC4DA}" type="datetimeFigureOut">
               <a:rPr lang="en-US" smtClean="0"/>
-              <a:t>4/5/2022</a:t>
+              <a:t>4/10/2022</a:t>
             </a:fld>
             <a:endParaRPr lang="en-US"/>
           </a:p>
@@ -763,7 +763,7 @@
           <a:p>
             <a:fld id="{8A2BB69E-2060-441C-AF3E-3E70B44CC4DA}" type="datetimeFigureOut">
               <a:rPr lang="en-US" smtClean="0"/>
-              <a:t>4/5/2022</a:t>
+              <a:t>4/10/2022</a:t>
             </a:fld>
             <a:endParaRPr lang="en-US"/>
           </a:p>
@@ -1009,7 +1009,7 @@
           <a:p>
             <a:fld id="{8A2BB69E-2060-441C-AF3E-3E70B44CC4DA}" type="datetimeFigureOut">
               <a:rPr lang="en-US" smtClean="0"/>
-              <a:t>4/5/2022</a:t>
+              <a:t>4/10/2022</a:t>
             </a:fld>
             <a:endParaRPr lang="en-US"/>
           </a:p>
@@ -1241,7 +1241,7 @@
           <a:p>
             <a:fld id="{8A2BB69E-2060-441C-AF3E-3E70B44CC4DA}" type="datetimeFigureOut">
               <a:rPr lang="en-US" smtClean="0"/>
-              <a:t>4/5/2022</a:t>
+              <a:t>4/10/2022</a:t>
             </a:fld>
             <a:endParaRPr lang="en-US"/>
           </a:p>
@@ -1608,7 +1608,7 @@
           <a:p>
             <a:fld id="{8A2BB69E-2060-441C-AF3E-3E70B44CC4DA}" type="datetimeFigureOut">
               <a:rPr lang="en-US" smtClean="0"/>
-              <a:t>4/5/2022</a:t>
+              <a:t>4/10/2022</a:t>
             </a:fld>
             <a:endParaRPr lang="en-US"/>
           </a:p>
@@ -1726,7 +1726,7 @@
           <a:p>
             <a:fld id="{8A2BB69E-2060-441C-AF3E-3E70B44CC4DA}" type="datetimeFigureOut">
               <a:rPr lang="en-US" smtClean="0"/>
-              <a:t>4/5/2022</a:t>
+              <a:t>4/10/2022</a:t>
             </a:fld>
             <a:endParaRPr lang="en-US"/>
           </a:p>
@@ -1821,7 +1821,7 @@
           <a:p>
             <a:fld id="{8A2BB69E-2060-441C-AF3E-3E70B44CC4DA}" type="datetimeFigureOut">
               <a:rPr lang="en-US" smtClean="0"/>
-              <a:t>4/5/2022</a:t>
+              <a:t>4/10/2022</a:t>
             </a:fld>
             <a:endParaRPr lang="en-US"/>
           </a:p>
@@ -2098,7 +2098,7 @@
           <a:p>
             <a:fld id="{8A2BB69E-2060-441C-AF3E-3E70B44CC4DA}" type="datetimeFigureOut">
               <a:rPr lang="en-US" smtClean="0"/>
-              <a:t>4/5/2022</a:t>
+              <a:t>4/10/2022</a:t>
             </a:fld>
             <a:endParaRPr lang="en-US"/>
           </a:p>
@@ -2355,7 +2355,7 @@
           <a:p>
             <a:fld id="{8A2BB69E-2060-441C-AF3E-3E70B44CC4DA}" type="datetimeFigureOut">
               <a:rPr lang="en-US" smtClean="0"/>
-              <a:t>4/5/2022</a:t>
+              <a:t>4/10/2022</a:t>
             </a:fld>
             <a:endParaRPr lang="en-US"/>
           </a:p>
@@ -2568,7 +2568,7 @@
           <a:p>
             <a:fld id="{8A2BB69E-2060-441C-AF3E-3E70B44CC4DA}" type="datetimeFigureOut">
               <a:rPr lang="en-US" smtClean="0"/>
-              <a:t>4/5/2022</a:t>
+              <a:t>4/10/2022</a:t>
             </a:fld>
             <a:endParaRPr lang="en-US"/>
           </a:p>
@@ -3039,8 +3039,8 @@
           </a:p>
         </p:txBody>
       </p:sp>
-      <mc:AlternateContent xmlns:mc="http://schemas.openxmlformats.org/markup-compatibility/2006">
-        <mc:Choice xmlns:a14="http://schemas.microsoft.com/office/drawing/2010/main" Requires="a14">
+      <mc:AlternateContent xmlns:mc="http://schemas.openxmlformats.org/markup-compatibility/2006" xmlns:a14="http://schemas.microsoft.com/office/drawing/2010/main">
+        <mc:Choice Requires="a14">
           <p:sp>
             <p:nvSpPr>
               <p:cNvPr id="2" name="Rectangle 1">
@@ -3127,7 +3127,7 @@
             </p:txBody>
           </p:sp>
         </mc:Choice>
-        <mc:Fallback>
+        <mc:Fallback xmlns="">
           <p:sp>
             <p:nvSpPr>
               <p:cNvPr id="2" name="Rectangle 1">
@@ -3322,7 +3322,21 @@
                 <a:latin typeface="Helvetica" panose="020B0604020202020204" pitchFamily="34" charset="0"/>
                 <a:cs typeface="Helvetica" panose="020B0604020202020204" pitchFamily="34" charset="0"/>
               </a:rPr>
-              <a:t>Basic operator 1</a:t>
+              <a:t>C</a:t>
+            </a:r>
+            <a:r>
+              <a:rPr lang="en-US" altLang="zh-CN" sz="1000" dirty="0">
+                <a:latin typeface="Helvetica" panose="020B0604020202020204" pitchFamily="34" charset="0"/>
+                <a:cs typeface="Helvetica" panose="020B0604020202020204" pitchFamily="34" charset="0"/>
+              </a:rPr>
+              <a:t>ommon</a:t>
+            </a:r>
+            <a:r>
+              <a:rPr lang="en-US" sz="1000" dirty="0">
+                <a:latin typeface="Helvetica" panose="020B0604020202020204" pitchFamily="34" charset="0"/>
+                <a:cs typeface="Helvetica" panose="020B0604020202020204" pitchFamily="34" charset="0"/>
+              </a:rPr>
+              <a:t> operator 1</a:t>
             </a:r>
           </a:p>
         </p:txBody>
@@ -3382,7 +3396,21 @@
                 <a:latin typeface="Helvetica" panose="020B0604020202020204" pitchFamily="34" charset="0"/>
                 <a:cs typeface="Helvetica" panose="020B0604020202020204" pitchFamily="34" charset="0"/>
               </a:rPr>
-              <a:t>Basic operator 2</a:t>
+              <a:t>C</a:t>
+            </a:r>
+            <a:r>
+              <a:rPr lang="en-US" altLang="zh-CN" sz="1000" dirty="0">
+                <a:latin typeface="Helvetica" panose="020B0604020202020204" pitchFamily="34" charset="0"/>
+                <a:cs typeface="Helvetica" panose="020B0604020202020204" pitchFamily="34" charset="0"/>
+              </a:rPr>
+              <a:t>ommon</a:t>
+            </a:r>
+            <a:r>
+              <a:rPr lang="en-US" sz="1000" dirty="0">
+                <a:latin typeface="Helvetica" panose="020B0604020202020204" pitchFamily="34" charset="0"/>
+                <a:cs typeface="Helvetica" panose="020B0604020202020204" pitchFamily="34" charset="0"/>
+              </a:rPr>
+              <a:t> operator 2</a:t>
             </a:r>
           </a:p>
         </p:txBody>
@@ -3440,11 +3468,32 @@
               <a:p>
                 <a:pPr algn="ctr"/>
                 <a:r>
+                  <a:rPr lang="en-US" sz="1000">
+                    <a:latin typeface="Helvetica" panose="020B0604020202020204" pitchFamily="34" charset="0"/>
+                    <a:cs typeface="Helvetica" panose="020B0604020202020204" pitchFamily="34" charset="0"/>
+                  </a:rPr>
+                  <a:t>C</a:t>
+                </a:r>
+                <a:r>
+                  <a:rPr lang="en-US" altLang="zh-CN" sz="1000">
+                    <a:latin typeface="Helvetica" panose="020B0604020202020204" pitchFamily="34" charset="0"/>
+                    <a:cs typeface="Helvetica" panose="020B0604020202020204" pitchFamily="34" charset="0"/>
+                  </a:rPr>
+                  <a:t>ommon</a:t>
+                </a:r>
+                <a:r>
+                  <a:rPr lang="en-US" sz="1000">
+                    <a:latin typeface="Helvetica" panose="020B0604020202020204" pitchFamily="34" charset="0"/>
+                    <a:cs typeface="Helvetica" panose="020B0604020202020204" pitchFamily="34" charset="0"/>
+                  </a:rPr>
+                  <a:t> </a:t>
+                </a:r>
+                <a:r>
                   <a:rPr lang="en-US" sz="1000" dirty="0">
                     <a:latin typeface="Helvetica" panose="020B0604020202020204" pitchFamily="34" charset="0"/>
                     <a:cs typeface="Helvetica" panose="020B0604020202020204" pitchFamily="34" charset="0"/>
                   </a:rPr>
-                  <a:t>Basic operator </a:t>
+                  <a:t>operator </a:t>
                 </a:r>
                 <a14:m>
                   <m:oMath xmlns:m="http://schemas.openxmlformats.org/officeDocument/2006/math">
@@ -6725,7 +6774,7 @@
         </p:nvSpPr>
         <p:spPr>
           <a:xfrm>
-            <a:off x="5147551" y="41097"/>
+            <a:off x="5145920" y="47228"/>
             <a:ext cx="3063922" cy="1684145"/>
           </a:xfrm>
           <a:prstGeom prst="rect">
@@ -6777,8 +6826,8 @@
           </a:p>
         </p:txBody>
       </p:sp>
-      <mc:AlternateContent xmlns:mc="http://schemas.openxmlformats.org/markup-compatibility/2006">
-        <mc:Choice xmlns:a14="http://schemas.microsoft.com/office/drawing/2010/main" Requires="a14">
+      <mc:AlternateContent xmlns:mc="http://schemas.openxmlformats.org/markup-compatibility/2006" xmlns:a14="http://schemas.microsoft.com/office/drawing/2010/main">
+        <mc:Choice Requires="a14">
           <p:sp>
             <p:nvSpPr>
               <p:cNvPr id="278" name="Rectangle: Rounded Corners 277">
@@ -6793,8 +6842,8 @@
             </p:nvSpPr>
             <p:spPr>
               <a:xfrm>
-                <a:off x="5232302" y="1074869"/>
-                <a:ext cx="812069" cy="505430"/>
+                <a:off x="5251238" y="1039624"/>
+                <a:ext cx="830792" cy="590043"/>
               </a:xfrm>
               <a:prstGeom prst="roundRect">
                 <a:avLst/>
@@ -6829,15 +6878,8 @@
               <a:lstStyle/>
               <a:p>
                 <a:pPr algn="ctr"/>
-                <a:endParaRPr lang="en-US" sz="1000" dirty="0">
-                  <a:latin typeface="Helvetica" panose="020B0604020202020204" pitchFamily="34" charset="0"/>
-                  <a:cs typeface="Helvetica" panose="020B0604020202020204" pitchFamily="34" charset="0"/>
-                </a:endParaRPr>
-              </a:p>
-              <a:p>
-                <a:pPr algn="ctr"/>
                 <a:r>
-                  <a:rPr lang="en-US" sz="1000" dirty="0">
+                  <a:rPr lang="en-US" sz="900" dirty="0">
                     <a:latin typeface="Helvetica" panose="020B0604020202020204" pitchFamily="34" charset="0"/>
                     <a:cs typeface="Helvetica" panose="020B0604020202020204" pitchFamily="34" charset="0"/>
                   </a:rPr>
@@ -6847,52 +6889,83 @@
               <a:p>
                 <a:pPr algn="ctr"/>
                 <a:r>
-                  <a:rPr lang="en-US" sz="1000" dirty="0">
+                  <a:rPr lang="en-US" sz="900" dirty="0">
                     <a:latin typeface="Helvetica" panose="020B0604020202020204" pitchFamily="34" charset="0"/>
                     <a:cs typeface="Helvetica" panose="020B0604020202020204" pitchFamily="34" charset="0"/>
                   </a:rPr>
-                  <a:t>Local data </a:t>
+                  <a:t>Gradient Update </a:t>
                 </a:r>
                 <a14:m>
                   <m:oMath xmlns:m="http://schemas.openxmlformats.org/officeDocument/2006/math">
+                    <m:r>
+                      <m:rPr>
+                        <m:sty m:val="p"/>
+                      </m:rPr>
+                      <a:rPr lang="en-US" sz="900" b="0" i="1" smtClean="0">
+                        <a:latin typeface="Cambria Math" panose="02040503050406030204" pitchFamily="18" charset="0"/>
+                        <a:ea typeface="Cambria Math" panose="02040503050406030204" pitchFamily="18" charset="0"/>
+                        <a:cs typeface="Helvetica" panose="020B0604020202020204" pitchFamily="34" charset="0"/>
+                      </a:rPr>
+                      <m:t>∇</m:t>
+                    </m:r>
+                    <m:r>
+                      <a:rPr lang="en-US" sz="900" b="0" i="1" smtClean="0">
+                        <a:latin typeface="Cambria Math" panose="02040503050406030204" pitchFamily="18" charset="0"/>
+                        <a:ea typeface="Cambria Math" panose="02040503050406030204" pitchFamily="18" charset="0"/>
+                        <a:cs typeface="Helvetica" panose="020B0604020202020204" pitchFamily="34" charset="0"/>
+                      </a:rPr>
+                      <m:t>𝑓</m:t>
+                    </m:r>
+                    <m:r>
+                      <a:rPr lang="en-US" sz="900" b="0" i="1" smtClean="0">
+                        <a:latin typeface="Cambria Math" panose="02040503050406030204" pitchFamily="18" charset="0"/>
+                        <a:ea typeface="Cambria Math" panose="02040503050406030204" pitchFamily="18" charset="0"/>
+                        <a:cs typeface="Helvetica" panose="020B0604020202020204" pitchFamily="34" charset="0"/>
+                      </a:rPr>
+                      <m:t>(</m:t>
+                    </m:r>
                     <m:sSub>
                       <m:sSubPr>
                         <m:ctrlPr>
-                          <a:rPr lang="en-US" sz="1000" b="1" i="1" dirty="0">
+                          <a:rPr lang="en-US" sz="900" b="0" i="1" smtClean="0">
                             <a:latin typeface="Cambria Math" panose="02040503050406030204" pitchFamily="18" charset="0"/>
+                            <a:ea typeface="Cambria Math" panose="02040503050406030204" pitchFamily="18" charset="0"/>
                             <a:cs typeface="Helvetica" panose="020B0604020202020204" pitchFamily="34" charset="0"/>
                           </a:rPr>
                         </m:ctrlPr>
                       </m:sSubPr>
                       <m:e>
                         <m:r>
-                          <a:rPr lang="en-US" sz="1000" b="1" i="1" dirty="0">
+                          <a:rPr lang="en-US" sz="900" b="0" i="1" smtClean="0">
                             <a:latin typeface="Cambria Math" panose="02040503050406030204" pitchFamily="18" charset="0"/>
+                            <a:ea typeface="Cambria Math" panose="02040503050406030204" pitchFamily="18" charset="0"/>
                             <a:cs typeface="Helvetica" panose="020B0604020202020204" pitchFamily="34" charset="0"/>
                           </a:rPr>
-                          <m:t>𝑿</m:t>
+                          <m:t>𝑋</m:t>
                         </m:r>
                       </m:e>
                       <m:sub>
                         <m:r>
-                          <a:rPr lang="en-US" sz="1000" b="1" i="1" dirty="0">
+                          <a:rPr lang="en-US" sz="900" b="0" i="1" smtClean="0">
                             <a:latin typeface="Cambria Math" panose="02040503050406030204" pitchFamily="18" charset="0"/>
+                            <a:ea typeface="Cambria Math" panose="02040503050406030204" pitchFamily="18" charset="0"/>
                             <a:cs typeface="Helvetica" panose="020B0604020202020204" pitchFamily="34" charset="0"/>
                           </a:rPr>
-                          <m:t>𝟏</m:t>
+                          <m:t>1</m:t>
                         </m:r>
                       </m:sub>
                     </m:sSub>
+                    <m:r>
+                      <a:rPr lang="en-US" sz="900" b="0" i="1" smtClean="0">
+                        <a:latin typeface="Cambria Math" panose="02040503050406030204" pitchFamily="18" charset="0"/>
+                        <a:ea typeface="Cambria Math" panose="02040503050406030204" pitchFamily="18" charset="0"/>
+                        <a:cs typeface="Helvetica" panose="020B0604020202020204" pitchFamily="34" charset="0"/>
+                      </a:rPr>
+                      <m:t>)</m:t>
+                    </m:r>
                   </m:oMath>
                 </a14:m>
-                <a:endParaRPr lang="en-US" sz="1000" b="1" dirty="0">
-                  <a:latin typeface="Helvetica" panose="020B0604020202020204" pitchFamily="34" charset="0"/>
-                  <a:cs typeface="Helvetica" panose="020B0604020202020204" pitchFamily="34" charset="0"/>
-                </a:endParaRPr>
-              </a:p>
-              <a:p>
-                <a:pPr algn="ctr"/>
-                <a:endParaRPr lang="en-US" sz="1000" dirty="0">
+                <a:endParaRPr lang="en-US" sz="900" dirty="0">
                   <a:latin typeface="Helvetica" panose="020B0604020202020204" pitchFamily="34" charset="0"/>
                   <a:cs typeface="Helvetica" panose="020B0604020202020204" pitchFamily="34" charset="0"/>
                 </a:endParaRPr>
@@ -6900,7 +6973,7 @@
             </p:txBody>
           </p:sp>
         </mc:Choice>
-        <mc:Fallback>
+        <mc:Fallback xmlns="">
           <p:sp>
             <p:nvSpPr>
               <p:cNvPr id="278" name="Rectangle: Rounded Corners 277">
@@ -6917,8 +6990,8 @@
             </p:nvSpPr>
             <p:spPr>
               <a:xfrm>
-                <a:off x="5232302" y="1074869"/>
-                <a:ext cx="812069" cy="505430"/>
+                <a:off x="5251238" y="1039624"/>
+                <a:ext cx="830792" cy="590043"/>
               </a:xfrm>
               <a:prstGeom prst="roundRect">
                 <a:avLst/>
@@ -6926,7 +6999,7 @@
               <a:blipFill>
                 <a:blip r:embed="rId4"/>
                 <a:stretch>
-                  <a:fillRect t="-3614" b="-9639"/>
+                  <a:fillRect t="-4167" b="-6250"/>
                 </a:stretch>
               </a:blipFill>
               <a:ln>
@@ -6948,8 +7021,8 @@
           </p:sp>
         </mc:Fallback>
       </mc:AlternateContent>
-      <mc:AlternateContent xmlns:mc="http://schemas.openxmlformats.org/markup-compatibility/2006">
-        <mc:Choice xmlns:a14="http://schemas.microsoft.com/office/drawing/2010/main" Requires="a14">
+      <mc:AlternateContent xmlns:mc="http://schemas.openxmlformats.org/markup-compatibility/2006" xmlns:a14="http://schemas.microsoft.com/office/drawing/2010/main">
+        <mc:Choice Requires="a14">
           <p:sp>
             <p:nvSpPr>
               <p:cNvPr id="297" name="TextBox 296">
@@ -7004,7 +7077,7 @@
             </p:txBody>
           </p:sp>
         </mc:Choice>
-        <mc:Fallback>
+        <mc:Fallback xmlns="">
           <p:sp>
             <p:nvSpPr>
               <p:cNvPr id="297" name="TextBox 296">
@@ -7125,74 +7198,14 @@
           </a:p>
         </p:txBody>
       </p:sp>
-      <p:sp>
-        <p:nvSpPr>
-          <p:cNvPr id="362" name="Rectangle: Rounded Corners 361">
-            <a:extLst>
-              <a:ext uri="{FF2B5EF4-FFF2-40B4-BE49-F238E27FC236}">
-                <a16:creationId xmlns:a16="http://schemas.microsoft.com/office/drawing/2014/main" id="{094CC385-019F-402B-BD14-F44F7D1F8E04}"/>
-              </a:ext>
-            </a:extLst>
-          </p:cNvPr>
-          <p:cNvSpPr/>
-          <p:nvPr/>
-        </p:nvSpPr>
-        <p:spPr>
-          <a:xfrm>
-            <a:off x="6241660" y="300615"/>
-            <a:ext cx="812069" cy="352359"/>
-          </a:xfrm>
-          <a:prstGeom prst="roundRect">
-            <a:avLst/>
-          </a:prstGeom>
-          <a:solidFill>
-            <a:schemeClr val="accent4">
-              <a:lumMod val="75000"/>
-            </a:schemeClr>
-          </a:solidFill>
-          <a:ln>
-            <a:noFill/>
-          </a:ln>
-        </p:spPr>
-        <p:style>
-          <a:lnRef idx="2">
-            <a:schemeClr val="accent1">
-              <a:shade val="50000"/>
-            </a:schemeClr>
-          </a:lnRef>
-          <a:fillRef idx="1">
-            <a:schemeClr val="accent1"/>
-          </a:fillRef>
-          <a:effectRef idx="0">
-            <a:schemeClr val="accent1"/>
-          </a:effectRef>
-          <a:fontRef idx="minor">
-            <a:schemeClr val="lt1"/>
-          </a:fontRef>
-        </p:style>
-        <p:txBody>
-          <a:bodyPr rtlCol="0" anchor="ctr"/>
-          <a:lstStyle/>
-          <a:p>
-            <a:pPr algn="ctr"/>
-            <a:r>
-              <a:rPr lang="en-US" sz="1000" dirty="0">
-                <a:latin typeface="Helvetica" panose="020B0604020202020204" pitchFamily="34" charset="0"/>
-                <a:cs typeface="Helvetica" panose="020B0604020202020204" pitchFamily="34" charset="0"/>
-              </a:rPr>
-              <a:t>Central Server</a:t>
-            </a:r>
-          </a:p>
-        </p:txBody>
-      </p:sp>
-      <mc:AlternateContent xmlns:mc="http://schemas.openxmlformats.org/markup-compatibility/2006">
-        <mc:Choice xmlns:a14="http://schemas.microsoft.com/office/drawing/2010/main" Requires="a14">
+      <mc:AlternateContent xmlns:mc="http://schemas.openxmlformats.org/markup-compatibility/2006" xmlns:a14="http://schemas.microsoft.com/office/drawing/2010/main">
+        <mc:Choice Requires="a14">
           <p:sp>
             <p:nvSpPr>
-              <p:cNvPr id="376" name="Rectangle: Rounded Corners 375">
+              <p:cNvPr id="362" name="Rectangle: Rounded Corners 361">
                 <a:extLst>
                   <a:ext uri="{FF2B5EF4-FFF2-40B4-BE49-F238E27FC236}">
-                    <a16:creationId xmlns:a16="http://schemas.microsoft.com/office/drawing/2014/main" id="{AA12B2EC-DC13-4557-BCC3-83303069BA34}"/>
+                    <a16:creationId xmlns:a16="http://schemas.microsoft.com/office/drawing/2014/main" id="{094CC385-019F-402B-BD14-F44F7D1F8E04}"/>
                   </a:ext>
                 </a:extLst>
               </p:cNvPr>
@@ -7201,8 +7214,8 @@
             </p:nvSpPr>
             <p:spPr>
               <a:xfrm>
-                <a:off x="6130618" y="1082724"/>
-                <a:ext cx="812069" cy="505430"/>
+                <a:off x="6213804" y="296861"/>
+                <a:ext cx="1077865" cy="352359"/>
               </a:xfrm>
               <a:prstGeom prst="roundRect">
                 <a:avLst/>
@@ -7237,19 +7250,12 @@
               <a:lstStyle/>
               <a:p>
                 <a:pPr algn="ctr"/>
-                <a:endParaRPr lang="en-US" sz="1000" dirty="0">
-                  <a:latin typeface="Helvetica" panose="020B0604020202020204" pitchFamily="34" charset="0"/>
-                  <a:cs typeface="Helvetica" panose="020B0604020202020204" pitchFamily="34" charset="0"/>
-                </a:endParaRPr>
-              </a:p>
-              <a:p>
-                <a:pPr algn="ctr"/>
                 <a:r>
                   <a:rPr lang="en-US" sz="1000" dirty="0">
                     <a:latin typeface="Helvetica" panose="020B0604020202020204" pitchFamily="34" charset="0"/>
                     <a:cs typeface="Helvetica" panose="020B0604020202020204" pitchFamily="34" charset="0"/>
                   </a:rPr>
-                  <a:t>Agent 2</a:t>
+                  <a:t>Central Server</a:t>
                 </a:r>
               </a:p>
               <a:p>
@@ -7259,47 +7265,19 @@
                     <a:latin typeface="Helvetica" panose="020B0604020202020204" pitchFamily="34" charset="0"/>
                     <a:cs typeface="Helvetica" panose="020B0604020202020204" pitchFamily="34" charset="0"/>
                   </a:rPr>
-                  <a:t>Local data </a:t>
+                  <a:t>Network </a:t>
                 </a:r>
                 <a14:m>
                   <m:oMath xmlns:m="http://schemas.openxmlformats.org/officeDocument/2006/math">
-                    <m:sSub>
-                      <m:sSubPr>
-                        <m:ctrlPr>
-                          <a:rPr lang="en-US" sz="1000" b="1" i="1" dirty="0">
-                            <a:latin typeface="Cambria Math" panose="02040503050406030204" pitchFamily="18" charset="0"/>
-                            <a:cs typeface="Helvetica" panose="020B0604020202020204" pitchFamily="34" charset="0"/>
-                          </a:rPr>
-                        </m:ctrlPr>
-                      </m:sSubPr>
-                      <m:e>
-                        <m:r>
-                          <a:rPr lang="en-US" sz="1000" b="1" i="1" dirty="0">
-                            <a:latin typeface="Cambria Math" panose="02040503050406030204" pitchFamily="18" charset="0"/>
-                            <a:cs typeface="Helvetica" panose="020B0604020202020204" pitchFamily="34" charset="0"/>
-                          </a:rPr>
-                          <m:t>𝑿</m:t>
-                        </m:r>
-                      </m:e>
-                      <m:sub>
-                        <m:r>
-                          <a:rPr lang="en-US" sz="1000" b="1" i="1" dirty="0">
-                            <a:latin typeface="Cambria Math" panose="02040503050406030204" pitchFamily="18" charset="0"/>
-                            <a:cs typeface="Helvetica" panose="020B0604020202020204" pitchFamily="34" charset="0"/>
-                          </a:rPr>
-                          <m:t>𝟐</m:t>
-                        </m:r>
-                      </m:sub>
-                    </m:sSub>
+                    <m:r>
+                      <a:rPr lang="en-US" sz="1000" b="0" i="1" smtClean="0">
+                        <a:latin typeface="Cambria Math" panose="02040503050406030204" pitchFamily="18" charset="0"/>
+                        <a:cs typeface="Helvetica" panose="020B0604020202020204" pitchFamily="34" charset="0"/>
+                      </a:rPr>
+                      <m:t>𝑓</m:t>
+                    </m:r>
                   </m:oMath>
                 </a14:m>
-                <a:endParaRPr lang="en-US" sz="1000" b="1" dirty="0">
-                  <a:latin typeface="Helvetica" panose="020B0604020202020204" pitchFamily="34" charset="0"/>
-                  <a:cs typeface="Helvetica" panose="020B0604020202020204" pitchFamily="34" charset="0"/>
-                </a:endParaRPr>
-              </a:p>
-              <a:p>
-                <a:pPr algn="ctr"/>
                 <a:endParaRPr lang="en-US" sz="1000" dirty="0">
                   <a:latin typeface="Helvetica" panose="020B0604020202020204" pitchFamily="34" charset="0"/>
                   <a:cs typeface="Helvetica" panose="020B0604020202020204" pitchFamily="34" charset="0"/>
@@ -7308,13 +7286,13 @@
             </p:txBody>
           </p:sp>
         </mc:Choice>
-        <mc:Fallback>
+        <mc:Fallback xmlns="">
           <p:sp>
             <p:nvSpPr>
-              <p:cNvPr id="376" name="Rectangle: Rounded Corners 375">
+              <p:cNvPr id="362" name="Rectangle: Rounded Corners 361">
                 <a:extLst>
                   <a:ext uri="{FF2B5EF4-FFF2-40B4-BE49-F238E27FC236}">
-                    <a16:creationId xmlns:a16="http://schemas.microsoft.com/office/drawing/2014/main" id="{AA12B2EC-DC13-4557-BCC3-83303069BA34}"/>
+                    <a16:creationId xmlns:a16="http://schemas.microsoft.com/office/drawing/2014/main" id="{094CC385-019F-402B-BD14-F44F7D1F8E04}"/>
                   </a:ext>
                 </a:extLst>
               </p:cNvPr>
@@ -7325,8 +7303,8 @@
             </p:nvSpPr>
             <p:spPr>
               <a:xfrm>
-                <a:off x="6130618" y="1082724"/>
-                <a:ext cx="812069" cy="505430"/>
+                <a:off x="6213804" y="296861"/>
+                <a:ext cx="1077865" cy="352359"/>
               </a:xfrm>
               <a:prstGeom prst="roundRect">
                 <a:avLst/>
@@ -7334,193 +7312,7 @@
               <a:blipFill>
                 <a:blip r:embed="rId6"/>
                 <a:stretch>
-                  <a:fillRect t="-4819" b="-9639"/>
-                </a:stretch>
-              </a:blipFill>
-              <a:ln>
-                <a:noFill/>
-              </a:ln>
-            </p:spPr>
-            <p:txBody>
-              <a:bodyPr/>
-              <a:lstStyle/>
-              <a:p>
-                <a:r>
-                  <a:rPr lang="en-US">
-                    <a:noFill/>
-                  </a:rPr>
-                  <a:t> </a:t>
-                </a:r>
-              </a:p>
-            </p:txBody>
-          </p:sp>
-        </mc:Fallback>
-      </mc:AlternateContent>
-      <mc:AlternateContent xmlns:mc="http://schemas.openxmlformats.org/markup-compatibility/2006">
-        <mc:Choice xmlns:a14="http://schemas.microsoft.com/office/drawing/2010/main" Requires="a14">
-          <p:sp>
-            <p:nvSpPr>
-              <p:cNvPr id="377" name="Rectangle: Rounded Corners 376">
-                <a:extLst>
-                  <a:ext uri="{FF2B5EF4-FFF2-40B4-BE49-F238E27FC236}">
-                    <a16:creationId xmlns:a16="http://schemas.microsoft.com/office/drawing/2014/main" id="{8EA82ADD-3E4A-4977-9B24-0C95FD116CDD}"/>
-                  </a:ext>
-                </a:extLst>
-              </p:cNvPr>
-              <p:cNvSpPr/>
-              <p:nvPr/>
-            </p:nvSpPr>
-            <p:spPr>
-              <a:xfrm>
-                <a:off x="7257329" y="1066794"/>
-                <a:ext cx="812069" cy="505430"/>
-              </a:xfrm>
-              <a:prstGeom prst="roundRect">
-                <a:avLst/>
-              </a:prstGeom>
-              <a:solidFill>
-                <a:schemeClr val="accent4">
-                  <a:lumMod val="75000"/>
-                </a:schemeClr>
-              </a:solidFill>
-              <a:ln>
-                <a:noFill/>
-              </a:ln>
-            </p:spPr>
-            <p:style>
-              <a:lnRef idx="2">
-                <a:schemeClr val="accent1">
-                  <a:shade val="50000"/>
-                </a:schemeClr>
-              </a:lnRef>
-              <a:fillRef idx="1">
-                <a:schemeClr val="accent1"/>
-              </a:fillRef>
-              <a:effectRef idx="0">
-                <a:schemeClr val="accent1"/>
-              </a:effectRef>
-              <a:fontRef idx="minor">
-                <a:schemeClr val="lt1"/>
-              </a:fontRef>
-            </p:style>
-            <p:txBody>
-              <a:bodyPr rtlCol="0" anchor="ctr"/>
-              <a:lstStyle/>
-              <a:p>
-                <a:pPr algn="ctr"/>
-                <a:endParaRPr lang="en-US" sz="1000" dirty="0">
-                  <a:latin typeface="Helvetica" panose="020B0604020202020204" pitchFamily="34" charset="0"/>
-                  <a:cs typeface="Helvetica" panose="020B0604020202020204" pitchFamily="34" charset="0"/>
-                </a:endParaRPr>
-              </a:p>
-              <a:p>
-                <a:pPr algn="ctr"/>
-                <a:r>
-                  <a:rPr lang="en-US" sz="1000" dirty="0">
-                    <a:latin typeface="Helvetica" panose="020B0604020202020204" pitchFamily="34" charset="0"/>
-                    <a:cs typeface="Helvetica" panose="020B0604020202020204" pitchFamily="34" charset="0"/>
-                  </a:rPr>
-                  <a:t>Agent </a:t>
-                </a:r>
-                <a14:m>
-                  <m:oMath xmlns:m="http://schemas.openxmlformats.org/officeDocument/2006/math">
-                    <m:r>
-                      <a:rPr lang="en-US" sz="1000" i="1" dirty="0">
-                        <a:latin typeface="Cambria Math" panose="02040503050406030204" pitchFamily="18" charset="0"/>
-                        <a:cs typeface="Helvetica" panose="020B0604020202020204" pitchFamily="34" charset="0"/>
-                      </a:rPr>
-                      <m:t>𝑡</m:t>
-                    </m:r>
-                  </m:oMath>
-                </a14:m>
-                <a:endParaRPr lang="en-US" sz="1000" dirty="0">
-                  <a:latin typeface="Helvetica" panose="020B0604020202020204" pitchFamily="34" charset="0"/>
-                  <a:cs typeface="Helvetica" panose="020B0604020202020204" pitchFamily="34" charset="0"/>
-                </a:endParaRPr>
-              </a:p>
-              <a:p>
-                <a:pPr algn="ctr"/>
-                <a:r>
-                  <a:rPr lang="en-US" sz="1000" dirty="0">
-                    <a:latin typeface="Helvetica" panose="020B0604020202020204" pitchFamily="34" charset="0"/>
-                    <a:cs typeface="Helvetica" panose="020B0604020202020204" pitchFamily="34" charset="0"/>
-                  </a:rPr>
-                  <a:t>Local data </a:t>
-                </a:r>
-                <a14:m>
-                  <m:oMath xmlns:m="http://schemas.openxmlformats.org/officeDocument/2006/math">
-                    <m:sSub>
-                      <m:sSubPr>
-                        <m:ctrlPr>
-                          <a:rPr lang="en-US" sz="1000" b="1" i="1" dirty="0">
-                            <a:latin typeface="Cambria Math" panose="02040503050406030204" pitchFamily="18" charset="0"/>
-                            <a:cs typeface="Helvetica" panose="020B0604020202020204" pitchFamily="34" charset="0"/>
-                          </a:rPr>
-                        </m:ctrlPr>
-                      </m:sSubPr>
-                      <m:e>
-                        <m:r>
-                          <a:rPr lang="en-US" sz="1000" b="1" i="1" dirty="0">
-                            <a:latin typeface="Cambria Math" panose="02040503050406030204" pitchFamily="18" charset="0"/>
-                            <a:cs typeface="Helvetica" panose="020B0604020202020204" pitchFamily="34" charset="0"/>
-                          </a:rPr>
-                          <m:t>𝑿</m:t>
-                        </m:r>
-                      </m:e>
-                      <m:sub>
-                        <m:r>
-                          <a:rPr lang="en-US" sz="1000" b="1" i="1" dirty="0">
-                            <a:latin typeface="Cambria Math" panose="02040503050406030204" pitchFamily="18" charset="0"/>
-                            <a:cs typeface="Helvetica" panose="020B0604020202020204" pitchFamily="34" charset="0"/>
-                          </a:rPr>
-                          <m:t>𝒕</m:t>
-                        </m:r>
-                      </m:sub>
-                    </m:sSub>
-                  </m:oMath>
-                </a14:m>
-                <a:endParaRPr lang="en-US" sz="1000" b="1" dirty="0">
-                  <a:latin typeface="Helvetica" panose="020B0604020202020204" pitchFamily="34" charset="0"/>
-                  <a:cs typeface="Helvetica" panose="020B0604020202020204" pitchFamily="34" charset="0"/>
-                </a:endParaRPr>
-              </a:p>
-              <a:p>
-                <a:pPr algn="ctr"/>
-                <a:endParaRPr lang="en-US" sz="1000" dirty="0">
-                  <a:latin typeface="Helvetica" panose="020B0604020202020204" pitchFamily="34" charset="0"/>
-                  <a:cs typeface="Helvetica" panose="020B0604020202020204" pitchFamily="34" charset="0"/>
-                </a:endParaRPr>
-              </a:p>
-            </p:txBody>
-          </p:sp>
-        </mc:Choice>
-        <mc:Fallback>
-          <p:sp>
-            <p:nvSpPr>
-              <p:cNvPr id="377" name="Rectangle: Rounded Corners 376">
-                <a:extLst>
-                  <a:ext uri="{FF2B5EF4-FFF2-40B4-BE49-F238E27FC236}">
-                    <a16:creationId xmlns:a16="http://schemas.microsoft.com/office/drawing/2014/main" id="{8EA82ADD-3E4A-4977-9B24-0C95FD116CDD}"/>
-                  </a:ext>
-                </a:extLst>
-              </p:cNvPr>
-              <p:cNvSpPr>
-                <a:spLocks noRot="1" noChangeAspect="1" noMove="1" noResize="1" noEditPoints="1" noAdjustHandles="1" noChangeArrowheads="1" noChangeShapeType="1" noTextEdit="1"/>
-              </p:cNvSpPr>
-              <p:nvPr/>
-            </p:nvSpPr>
-            <p:spPr>
-              <a:xfrm>
-                <a:off x="7257329" y="1066794"/>
-                <a:ext cx="812069" cy="505430"/>
-              </a:xfrm>
-              <a:prstGeom prst="roundRect">
-                <a:avLst/>
-              </a:prstGeom>
-              <a:blipFill>
-                <a:blip r:embed="rId7"/>
-                <a:stretch>
-                  <a:fillRect t="-4819" b="-9639"/>
+                  <a:fillRect t="-7018" b="-15789"/>
                 </a:stretch>
               </a:blipFill>
               <a:ln>
@@ -7556,7 +7348,7 @@
         </p:nvSpPr>
         <p:spPr>
           <a:xfrm rot="10800000">
-            <a:off x="6885970" y="1242262"/>
+            <a:off x="6879421" y="1289686"/>
             <a:ext cx="412249" cy="307777"/>
           </a:xfrm>
           <a:prstGeom prst="rect">
@@ -7580,94 +7372,119 @@
           </a:p>
         </p:txBody>
       </p:sp>
-      <p:cxnSp>
-        <p:nvCxnSpPr>
-          <p:cNvPr id="381" name="Straight Arrow Connector 380">
+      <p:grpSp>
+        <p:nvGrpSpPr>
+          <p:cNvPr id="3" name="Group 2">
             <a:extLst>
               <a:ext uri="{FF2B5EF4-FFF2-40B4-BE49-F238E27FC236}">
-                <a16:creationId xmlns:a16="http://schemas.microsoft.com/office/drawing/2014/main" id="{0244C4AB-6858-450B-AA7E-53CE559E967C}"/>
+                <a16:creationId xmlns:a16="http://schemas.microsoft.com/office/drawing/2014/main" id="{CBE6873D-2617-44E2-AE69-2D29AF4F8A46}"/>
               </a:ext>
             </a:extLst>
           </p:cNvPr>
-          <p:cNvCxnSpPr>
-            <a:cxnSpLocks/>
-          </p:cNvCxnSpPr>
+          <p:cNvGrpSpPr/>
           <p:nvPr/>
-        </p:nvCxnSpPr>
-        <p:spPr>
-          <a:xfrm flipV="1">
-            <a:off x="6667262" y="655442"/>
-            <a:ext cx="0" cy="329184"/>
+        </p:nvGrpSpPr>
+        <p:grpSpPr>
+          <a:xfrm>
+            <a:off x="6661253" y="655442"/>
+            <a:ext cx="70789" cy="345365"/>
+            <a:chOff x="6596473" y="655442"/>
+            <a:chExt cx="70789" cy="345365"/>
           </a:xfrm>
-          <a:prstGeom prst="straightConnector1">
-            <a:avLst/>
-          </a:prstGeom>
-          <a:ln>
-            <a:solidFill>
+        </p:grpSpPr>
+        <p:cxnSp>
+          <p:nvCxnSpPr>
+            <p:cNvPr id="381" name="Straight Arrow Connector 380">
+              <a:extLst>
+                <a:ext uri="{FF2B5EF4-FFF2-40B4-BE49-F238E27FC236}">
+                  <a16:creationId xmlns:a16="http://schemas.microsoft.com/office/drawing/2014/main" id="{0244C4AB-6858-450B-AA7E-53CE559E967C}"/>
+                </a:ext>
+              </a:extLst>
+            </p:cNvPr>
+            <p:cNvCxnSpPr>
+              <a:cxnSpLocks/>
+            </p:cNvCxnSpPr>
+            <p:nvPr/>
+          </p:nvCxnSpPr>
+          <p:spPr>
+            <a:xfrm flipV="1">
+              <a:off x="6667262" y="655442"/>
+              <a:ext cx="0" cy="329184"/>
+            </a:xfrm>
+            <a:prstGeom prst="straightConnector1">
+              <a:avLst/>
+            </a:prstGeom>
+            <a:ln>
+              <a:solidFill>
+                <a:schemeClr val="accent4">
+                  <a:lumMod val="50000"/>
+                </a:schemeClr>
+              </a:solidFill>
+              <a:tailEnd type="triangle"/>
+            </a:ln>
+          </p:spPr>
+          <p:style>
+            <a:lnRef idx="1">
+              <a:schemeClr val="accent1"/>
+            </a:lnRef>
+            <a:fillRef idx="0">
+              <a:schemeClr val="accent1"/>
+            </a:fillRef>
+            <a:effectRef idx="0">
+              <a:schemeClr val="accent1"/>
+            </a:effectRef>
+            <a:fontRef idx="minor">
               <a:schemeClr val="tx1"/>
-            </a:solidFill>
-            <a:tailEnd type="triangle"/>
-          </a:ln>
-        </p:spPr>
-        <p:style>
-          <a:lnRef idx="1">
-            <a:schemeClr val="accent1"/>
-          </a:lnRef>
-          <a:fillRef idx="0">
-            <a:schemeClr val="accent1"/>
-          </a:fillRef>
-          <a:effectRef idx="0">
-            <a:schemeClr val="accent1"/>
-          </a:effectRef>
-          <a:fontRef idx="minor">
-            <a:schemeClr val="tx1"/>
-          </a:fontRef>
-        </p:style>
-      </p:cxnSp>
-      <p:cxnSp>
-        <p:nvCxnSpPr>
-          <p:cNvPr id="383" name="Straight Arrow Connector 382">
-            <a:extLst>
-              <a:ext uri="{FF2B5EF4-FFF2-40B4-BE49-F238E27FC236}">
-                <a16:creationId xmlns:a16="http://schemas.microsoft.com/office/drawing/2014/main" id="{0D536D46-375D-4412-A630-F04BF7CA380F}"/>
-              </a:ext>
-            </a:extLst>
-          </p:cNvPr>
-          <p:cNvCxnSpPr>
-            <a:cxnSpLocks/>
-          </p:cNvCxnSpPr>
-          <p:nvPr/>
-        </p:nvCxnSpPr>
-        <p:spPr>
-          <a:xfrm>
-            <a:off x="6596473" y="671623"/>
-            <a:ext cx="0" cy="329184"/>
-          </a:xfrm>
-          <a:prstGeom prst="straightConnector1">
-            <a:avLst/>
-          </a:prstGeom>
-          <a:ln>
-            <a:solidFill>
+            </a:fontRef>
+          </p:style>
+        </p:cxnSp>
+        <p:cxnSp>
+          <p:nvCxnSpPr>
+            <p:cNvPr id="383" name="Straight Arrow Connector 382">
+              <a:extLst>
+                <a:ext uri="{FF2B5EF4-FFF2-40B4-BE49-F238E27FC236}">
+                  <a16:creationId xmlns:a16="http://schemas.microsoft.com/office/drawing/2014/main" id="{0D536D46-375D-4412-A630-F04BF7CA380F}"/>
+                </a:ext>
+              </a:extLst>
+            </p:cNvPr>
+            <p:cNvCxnSpPr>
+              <a:cxnSpLocks/>
+            </p:cNvCxnSpPr>
+            <p:nvPr/>
+          </p:nvCxnSpPr>
+          <p:spPr>
+            <a:xfrm>
+              <a:off x="6596473" y="671623"/>
+              <a:ext cx="0" cy="329184"/>
+            </a:xfrm>
+            <a:prstGeom prst="straightConnector1">
+              <a:avLst/>
+            </a:prstGeom>
+            <a:ln>
+              <a:solidFill>
+                <a:schemeClr val="accent2">
+                  <a:lumMod val="50000"/>
+                </a:schemeClr>
+              </a:solidFill>
+              <a:tailEnd type="triangle"/>
+            </a:ln>
+          </p:spPr>
+          <p:style>
+            <a:lnRef idx="1">
+              <a:schemeClr val="accent1"/>
+            </a:lnRef>
+            <a:fillRef idx="0">
+              <a:schemeClr val="accent1"/>
+            </a:fillRef>
+            <a:effectRef idx="0">
+              <a:schemeClr val="accent1"/>
+            </a:effectRef>
+            <a:fontRef idx="minor">
               <a:schemeClr val="tx1"/>
-            </a:solidFill>
-            <a:tailEnd type="triangle"/>
-          </a:ln>
-        </p:spPr>
-        <p:style>
-          <a:lnRef idx="1">
-            <a:schemeClr val="accent1"/>
-          </a:lnRef>
-          <a:fillRef idx="0">
-            <a:schemeClr val="accent1"/>
-          </a:fillRef>
-          <a:effectRef idx="0">
-            <a:schemeClr val="accent1"/>
-          </a:effectRef>
-          <a:fontRef idx="minor">
-            <a:schemeClr val="tx1"/>
-          </a:fontRef>
-        </p:style>
-      </p:cxnSp>
+            </a:fontRef>
+          </p:style>
+        </p:cxnSp>
+      </p:grpSp>
       <p:sp>
         <p:nvSpPr>
           <p:cNvPr id="394" name="Rectangle 393">
@@ -7738,9 +7555,9 @@
           <p:nvPr/>
         </p:nvCxnSpPr>
         <p:spPr>
-          <a:xfrm flipV="1">
-            <a:off x="4884833" y="883171"/>
-            <a:ext cx="262718" cy="3103"/>
+          <a:xfrm>
+            <a:off x="4884834" y="886273"/>
+            <a:ext cx="261086" cy="3028"/>
           </a:xfrm>
           <a:prstGeom prst="straightConnector1">
             <a:avLst/>
@@ -7808,6 +7625,487 @@
                 <a:cs typeface="Helvetica" panose="020B0604020202020204" pitchFamily="34" charset="0"/>
               </a:rPr>
               <a:t>updates the central server w/ the local data</a:t>
+            </a:r>
+          </a:p>
+        </p:txBody>
+      </p:sp>
+      <p:sp>
+        <p:nvSpPr>
+          <p:cNvPr id="90" name="TextBox 89">
+            <a:extLst>
+              <a:ext uri="{FF2B5EF4-FFF2-40B4-BE49-F238E27FC236}">
+                <a16:creationId xmlns:a16="http://schemas.microsoft.com/office/drawing/2014/main" id="{D2AA8A96-E9C9-4E23-A239-3C573B004C47}"/>
+              </a:ext>
+            </a:extLst>
+          </p:cNvPr>
+          <p:cNvSpPr txBox="1"/>
+          <p:nvPr/>
+        </p:nvSpPr>
+        <p:spPr>
+          <a:xfrm>
+            <a:off x="6706577" y="674017"/>
+            <a:ext cx="1059609" cy="338554"/>
+          </a:xfrm>
+          <a:prstGeom prst="rect">
+            <a:avLst/>
+          </a:prstGeom>
+          <a:noFill/>
+        </p:spPr>
+        <p:txBody>
+          <a:bodyPr wrap="square" rtlCol="0">
+            <a:spAutoFit/>
+          </a:bodyPr>
+          <a:lstStyle/>
+          <a:p>
+            <a:r>
+              <a:rPr lang="en-US" sz="800" dirty="0">
+                <a:latin typeface="Helvetica" panose="020B0604020202020204" pitchFamily="34" charset="0"/>
+                <a:cs typeface="Helvetica" panose="020B0604020202020204" pitchFamily="34" charset="0"/>
+              </a:rPr>
+              <a:t>Gradient update w.r.t local data</a:t>
+            </a:r>
+          </a:p>
+        </p:txBody>
+      </p:sp>
+      <mc:AlternateContent xmlns:mc="http://schemas.openxmlformats.org/markup-compatibility/2006" xmlns:a14="http://schemas.microsoft.com/office/drawing/2010/main">
+        <mc:Choice Requires="a14">
+          <p:sp>
+            <p:nvSpPr>
+              <p:cNvPr id="92" name="Rectangle: Rounded Corners 91">
+                <a:extLst>
+                  <a:ext uri="{FF2B5EF4-FFF2-40B4-BE49-F238E27FC236}">
+                    <a16:creationId xmlns:a16="http://schemas.microsoft.com/office/drawing/2014/main" id="{C38953F9-FEE3-403F-A9BA-08E7786D80F2}"/>
+                  </a:ext>
+                </a:extLst>
+              </p:cNvPr>
+              <p:cNvSpPr/>
+              <p:nvPr/>
+            </p:nvSpPr>
+            <p:spPr>
+              <a:xfrm>
+                <a:off x="6142287" y="1036773"/>
+                <a:ext cx="844596" cy="590043"/>
+              </a:xfrm>
+              <a:prstGeom prst="roundRect">
+                <a:avLst/>
+              </a:prstGeom>
+              <a:solidFill>
+                <a:schemeClr val="accent4">
+                  <a:lumMod val="75000"/>
+                </a:schemeClr>
+              </a:solidFill>
+              <a:ln>
+                <a:noFill/>
+              </a:ln>
+            </p:spPr>
+            <p:style>
+              <a:lnRef idx="2">
+                <a:schemeClr val="accent1">
+                  <a:shade val="50000"/>
+                </a:schemeClr>
+              </a:lnRef>
+              <a:fillRef idx="1">
+                <a:schemeClr val="accent1"/>
+              </a:fillRef>
+              <a:effectRef idx="0">
+                <a:schemeClr val="accent1"/>
+              </a:effectRef>
+              <a:fontRef idx="minor">
+                <a:schemeClr val="lt1"/>
+              </a:fontRef>
+            </p:style>
+            <p:txBody>
+              <a:bodyPr rtlCol="0" anchor="ctr"/>
+              <a:lstStyle/>
+              <a:p>
+                <a:pPr algn="ctr"/>
+                <a:r>
+                  <a:rPr lang="en-US" sz="900" dirty="0">
+                    <a:latin typeface="Helvetica" panose="020B0604020202020204" pitchFamily="34" charset="0"/>
+                    <a:cs typeface="Helvetica" panose="020B0604020202020204" pitchFamily="34" charset="0"/>
+                  </a:rPr>
+                  <a:t>Agent 2</a:t>
+                </a:r>
+              </a:p>
+              <a:p>
+                <a:pPr algn="ctr"/>
+                <a:r>
+                  <a:rPr lang="en-US" sz="900" dirty="0">
+                    <a:latin typeface="Helvetica" panose="020B0604020202020204" pitchFamily="34" charset="0"/>
+                    <a:cs typeface="Helvetica" panose="020B0604020202020204" pitchFamily="34" charset="0"/>
+                  </a:rPr>
+                  <a:t>Gradient Update </a:t>
+                </a:r>
+                <a14:m>
+                  <m:oMath xmlns:m="http://schemas.openxmlformats.org/officeDocument/2006/math">
+                    <m:r>
+                      <m:rPr>
+                        <m:sty m:val="p"/>
+                      </m:rPr>
+                      <a:rPr lang="en-US" sz="900" i="1">
+                        <a:latin typeface="Cambria Math" panose="02040503050406030204" pitchFamily="18" charset="0"/>
+                        <a:ea typeface="Cambria Math" panose="02040503050406030204" pitchFamily="18" charset="0"/>
+                        <a:cs typeface="Helvetica" panose="020B0604020202020204" pitchFamily="34" charset="0"/>
+                      </a:rPr>
+                      <m:t>∇</m:t>
+                    </m:r>
+                    <m:r>
+                      <a:rPr lang="en-US" sz="900" i="1">
+                        <a:latin typeface="Cambria Math" panose="02040503050406030204" pitchFamily="18" charset="0"/>
+                        <a:ea typeface="Cambria Math" panose="02040503050406030204" pitchFamily="18" charset="0"/>
+                        <a:cs typeface="Helvetica" panose="020B0604020202020204" pitchFamily="34" charset="0"/>
+                      </a:rPr>
+                      <m:t>𝑓</m:t>
+                    </m:r>
+                    <m:r>
+                      <a:rPr lang="en-US" sz="900" i="1">
+                        <a:latin typeface="Cambria Math" panose="02040503050406030204" pitchFamily="18" charset="0"/>
+                        <a:ea typeface="Cambria Math" panose="02040503050406030204" pitchFamily="18" charset="0"/>
+                        <a:cs typeface="Helvetica" panose="020B0604020202020204" pitchFamily="34" charset="0"/>
+                      </a:rPr>
+                      <m:t>(</m:t>
+                    </m:r>
+                    <m:sSub>
+                      <m:sSubPr>
+                        <m:ctrlPr>
+                          <a:rPr lang="en-US" sz="900" i="1">
+                            <a:latin typeface="Cambria Math" panose="02040503050406030204" pitchFamily="18" charset="0"/>
+                            <a:ea typeface="Cambria Math" panose="02040503050406030204" pitchFamily="18" charset="0"/>
+                            <a:cs typeface="Helvetica" panose="020B0604020202020204" pitchFamily="34" charset="0"/>
+                          </a:rPr>
+                        </m:ctrlPr>
+                      </m:sSubPr>
+                      <m:e>
+                        <m:r>
+                          <a:rPr lang="en-US" sz="900" i="1">
+                            <a:latin typeface="Cambria Math" panose="02040503050406030204" pitchFamily="18" charset="0"/>
+                            <a:ea typeface="Cambria Math" panose="02040503050406030204" pitchFamily="18" charset="0"/>
+                            <a:cs typeface="Helvetica" panose="020B0604020202020204" pitchFamily="34" charset="0"/>
+                          </a:rPr>
+                          <m:t>𝑋</m:t>
+                        </m:r>
+                      </m:e>
+                      <m:sub>
+                        <m:r>
+                          <a:rPr lang="en-US" sz="900" b="0" i="1" smtClean="0">
+                            <a:latin typeface="Cambria Math" panose="02040503050406030204" pitchFamily="18" charset="0"/>
+                            <a:ea typeface="Cambria Math" panose="02040503050406030204" pitchFamily="18" charset="0"/>
+                            <a:cs typeface="Helvetica" panose="020B0604020202020204" pitchFamily="34" charset="0"/>
+                          </a:rPr>
+                          <m:t>2</m:t>
+                        </m:r>
+                      </m:sub>
+                    </m:sSub>
+                    <m:r>
+                      <a:rPr lang="en-US" sz="900" i="1">
+                        <a:latin typeface="Cambria Math" panose="02040503050406030204" pitchFamily="18" charset="0"/>
+                        <a:ea typeface="Cambria Math" panose="02040503050406030204" pitchFamily="18" charset="0"/>
+                        <a:cs typeface="Helvetica" panose="020B0604020202020204" pitchFamily="34" charset="0"/>
+                      </a:rPr>
+                      <m:t>)</m:t>
+                    </m:r>
+                  </m:oMath>
+                </a14:m>
+                <a:endParaRPr lang="en-US" sz="900" b="1" dirty="0">
+                  <a:latin typeface="Helvetica" panose="020B0604020202020204" pitchFamily="34" charset="0"/>
+                  <a:cs typeface="Helvetica" panose="020B0604020202020204" pitchFamily="34" charset="0"/>
+                </a:endParaRPr>
+              </a:p>
+            </p:txBody>
+          </p:sp>
+        </mc:Choice>
+        <mc:Fallback xmlns="">
+          <p:sp>
+            <p:nvSpPr>
+              <p:cNvPr id="92" name="Rectangle: Rounded Corners 91">
+                <a:extLst>
+                  <a:ext uri="{FF2B5EF4-FFF2-40B4-BE49-F238E27FC236}">
+                    <a16:creationId xmlns:a16="http://schemas.microsoft.com/office/drawing/2014/main" id="{C38953F9-FEE3-403F-A9BA-08E7786D80F2}"/>
+                  </a:ext>
+                </a:extLst>
+              </p:cNvPr>
+              <p:cNvSpPr>
+                <a:spLocks noRot="1" noChangeAspect="1" noMove="1" noResize="1" noEditPoints="1" noAdjustHandles="1" noChangeArrowheads="1" noChangeShapeType="1" noTextEdit="1"/>
+              </p:cNvSpPr>
+              <p:nvPr/>
+            </p:nvSpPr>
+            <p:spPr>
+              <a:xfrm>
+                <a:off x="6142287" y="1036773"/>
+                <a:ext cx="844596" cy="590043"/>
+              </a:xfrm>
+              <a:prstGeom prst="roundRect">
+                <a:avLst/>
+              </a:prstGeom>
+              <a:blipFill>
+                <a:blip r:embed="rId7"/>
+                <a:stretch>
+                  <a:fillRect t="-4124" b="-5155"/>
+                </a:stretch>
+              </a:blipFill>
+              <a:ln>
+                <a:noFill/>
+              </a:ln>
+            </p:spPr>
+            <p:txBody>
+              <a:bodyPr/>
+              <a:lstStyle/>
+              <a:p>
+                <a:r>
+                  <a:rPr lang="en-US">
+                    <a:noFill/>
+                  </a:rPr>
+                  <a:t> </a:t>
+                </a:r>
+              </a:p>
+            </p:txBody>
+          </p:sp>
+        </mc:Fallback>
+      </mc:AlternateContent>
+      <mc:AlternateContent xmlns:mc="http://schemas.openxmlformats.org/markup-compatibility/2006" xmlns:a14="http://schemas.microsoft.com/office/drawing/2010/main">
+        <mc:Choice Requires="a14">
+          <p:sp>
+            <p:nvSpPr>
+              <p:cNvPr id="94" name="Rectangle: Rounded Corners 93">
+                <a:extLst>
+                  <a:ext uri="{FF2B5EF4-FFF2-40B4-BE49-F238E27FC236}">
+                    <a16:creationId xmlns:a16="http://schemas.microsoft.com/office/drawing/2014/main" id="{FA4FFE71-4A45-4796-9DBF-7C4A95CA35CF}"/>
+                  </a:ext>
+                </a:extLst>
+              </p:cNvPr>
+              <p:cNvSpPr/>
+              <p:nvPr/>
+            </p:nvSpPr>
+            <p:spPr>
+              <a:xfrm>
+                <a:off x="7236385" y="1041924"/>
+                <a:ext cx="844596" cy="590043"/>
+              </a:xfrm>
+              <a:prstGeom prst="roundRect">
+                <a:avLst/>
+              </a:prstGeom>
+              <a:solidFill>
+                <a:schemeClr val="accent4">
+                  <a:lumMod val="75000"/>
+                </a:schemeClr>
+              </a:solidFill>
+              <a:ln>
+                <a:noFill/>
+              </a:ln>
+            </p:spPr>
+            <p:style>
+              <a:lnRef idx="2">
+                <a:schemeClr val="accent1">
+                  <a:shade val="50000"/>
+                </a:schemeClr>
+              </a:lnRef>
+              <a:fillRef idx="1">
+                <a:schemeClr val="accent1"/>
+              </a:fillRef>
+              <a:effectRef idx="0">
+                <a:schemeClr val="accent1"/>
+              </a:effectRef>
+              <a:fontRef idx="minor">
+                <a:schemeClr val="lt1"/>
+              </a:fontRef>
+            </p:style>
+            <p:txBody>
+              <a:bodyPr rtlCol="0" anchor="ctr"/>
+              <a:lstStyle/>
+              <a:p>
+                <a:pPr algn="ctr"/>
+                <a:r>
+                  <a:rPr lang="en-US" sz="900" dirty="0">
+                    <a:latin typeface="Helvetica" panose="020B0604020202020204" pitchFamily="34" charset="0"/>
+                    <a:cs typeface="Helvetica" panose="020B0604020202020204" pitchFamily="34" charset="0"/>
+                  </a:rPr>
+                  <a:t>Agent </a:t>
+                </a:r>
+                <a14:m>
+                  <m:oMath xmlns:m="http://schemas.openxmlformats.org/officeDocument/2006/math">
+                    <m:r>
+                      <a:rPr lang="en-US" sz="900" i="1" dirty="0" smtClean="0">
+                        <a:latin typeface="Cambria Math" panose="02040503050406030204" pitchFamily="18" charset="0"/>
+                        <a:cs typeface="Helvetica" panose="020B0604020202020204" pitchFamily="34" charset="0"/>
+                      </a:rPr>
+                      <m:t>𝑡</m:t>
+                    </m:r>
+                  </m:oMath>
+                </a14:m>
+                <a:endParaRPr lang="en-US" sz="900" dirty="0">
+                  <a:latin typeface="Helvetica" panose="020B0604020202020204" pitchFamily="34" charset="0"/>
+                  <a:cs typeface="Helvetica" panose="020B0604020202020204" pitchFamily="34" charset="0"/>
+                </a:endParaRPr>
+              </a:p>
+              <a:p>
+                <a:pPr algn="ctr"/>
+                <a:r>
+                  <a:rPr lang="en-US" sz="900" dirty="0">
+                    <a:latin typeface="Helvetica" panose="020B0604020202020204" pitchFamily="34" charset="0"/>
+                    <a:cs typeface="Helvetica" panose="020B0604020202020204" pitchFamily="34" charset="0"/>
+                  </a:rPr>
+                  <a:t>Gradient Update </a:t>
+                </a:r>
+                <a14:m>
+                  <m:oMath xmlns:m="http://schemas.openxmlformats.org/officeDocument/2006/math">
+                    <m:r>
+                      <m:rPr>
+                        <m:sty m:val="p"/>
+                      </m:rPr>
+                      <a:rPr lang="en-US" sz="900" i="1">
+                        <a:latin typeface="Cambria Math" panose="02040503050406030204" pitchFamily="18" charset="0"/>
+                        <a:ea typeface="Cambria Math" panose="02040503050406030204" pitchFamily="18" charset="0"/>
+                        <a:cs typeface="Helvetica" panose="020B0604020202020204" pitchFamily="34" charset="0"/>
+                      </a:rPr>
+                      <m:t>∇</m:t>
+                    </m:r>
+                    <m:r>
+                      <a:rPr lang="en-US" sz="900" i="1">
+                        <a:latin typeface="Cambria Math" panose="02040503050406030204" pitchFamily="18" charset="0"/>
+                        <a:ea typeface="Cambria Math" panose="02040503050406030204" pitchFamily="18" charset="0"/>
+                        <a:cs typeface="Helvetica" panose="020B0604020202020204" pitchFamily="34" charset="0"/>
+                      </a:rPr>
+                      <m:t>𝑓</m:t>
+                    </m:r>
+                    <m:r>
+                      <a:rPr lang="en-US" sz="900" i="1">
+                        <a:latin typeface="Cambria Math" panose="02040503050406030204" pitchFamily="18" charset="0"/>
+                        <a:ea typeface="Cambria Math" panose="02040503050406030204" pitchFamily="18" charset="0"/>
+                        <a:cs typeface="Helvetica" panose="020B0604020202020204" pitchFamily="34" charset="0"/>
+                      </a:rPr>
+                      <m:t>(</m:t>
+                    </m:r>
+                    <m:sSub>
+                      <m:sSubPr>
+                        <m:ctrlPr>
+                          <a:rPr lang="en-US" sz="900" i="1">
+                            <a:latin typeface="Cambria Math" panose="02040503050406030204" pitchFamily="18" charset="0"/>
+                            <a:ea typeface="Cambria Math" panose="02040503050406030204" pitchFamily="18" charset="0"/>
+                            <a:cs typeface="Helvetica" panose="020B0604020202020204" pitchFamily="34" charset="0"/>
+                          </a:rPr>
+                        </m:ctrlPr>
+                      </m:sSubPr>
+                      <m:e>
+                        <m:r>
+                          <a:rPr lang="en-US" sz="900" i="1">
+                            <a:latin typeface="Cambria Math" panose="02040503050406030204" pitchFamily="18" charset="0"/>
+                            <a:ea typeface="Cambria Math" panose="02040503050406030204" pitchFamily="18" charset="0"/>
+                            <a:cs typeface="Helvetica" panose="020B0604020202020204" pitchFamily="34" charset="0"/>
+                          </a:rPr>
+                          <m:t>𝑋</m:t>
+                        </m:r>
+                      </m:e>
+                      <m:sub>
+                        <m:r>
+                          <a:rPr lang="en-US" sz="900" b="0" i="1" smtClean="0">
+                            <a:latin typeface="Cambria Math" panose="02040503050406030204" pitchFamily="18" charset="0"/>
+                            <a:ea typeface="Cambria Math" panose="02040503050406030204" pitchFamily="18" charset="0"/>
+                            <a:cs typeface="Helvetica" panose="020B0604020202020204" pitchFamily="34" charset="0"/>
+                          </a:rPr>
+                          <m:t>𝑡</m:t>
+                        </m:r>
+                      </m:sub>
+                    </m:sSub>
+                    <m:r>
+                      <a:rPr lang="en-US" sz="900" i="1">
+                        <a:latin typeface="Cambria Math" panose="02040503050406030204" pitchFamily="18" charset="0"/>
+                        <a:ea typeface="Cambria Math" panose="02040503050406030204" pitchFamily="18" charset="0"/>
+                        <a:cs typeface="Helvetica" panose="020B0604020202020204" pitchFamily="34" charset="0"/>
+                      </a:rPr>
+                      <m:t>)</m:t>
+                    </m:r>
+                  </m:oMath>
+                </a14:m>
+                <a:endParaRPr lang="en-US" sz="900" b="1" dirty="0">
+                  <a:latin typeface="Helvetica" panose="020B0604020202020204" pitchFamily="34" charset="0"/>
+                  <a:cs typeface="Helvetica" panose="020B0604020202020204" pitchFamily="34" charset="0"/>
+                </a:endParaRPr>
+              </a:p>
+            </p:txBody>
+          </p:sp>
+        </mc:Choice>
+        <mc:Fallback xmlns="">
+          <p:sp>
+            <p:nvSpPr>
+              <p:cNvPr id="94" name="Rectangle: Rounded Corners 93">
+                <a:extLst>
+                  <a:ext uri="{FF2B5EF4-FFF2-40B4-BE49-F238E27FC236}">
+                    <a16:creationId xmlns:a16="http://schemas.microsoft.com/office/drawing/2014/main" id="{FA4FFE71-4A45-4796-9DBF-7C4A95CA35CF}"/>
+                  </a:ext>
+                </a:extLst>
+              </p:cNvPr>
+              <p:cNvSpPr>
+                <a:spLocks noRot="1" noChangeAspect="1" noMove="1" noResize="1" noEditPoints="1" noAdjustHandles="1" noChangeArrowheads="1" noChangeShapeType="1" noTextEdit="1"/>
+              </p:cNvSpPr>
+              <p:nvPr/>
+            </p:nvSpPr>
+            <p:spPr>
+              <a:xfrm>
+                <a:off x="7236385" y="1041924"/>
+                <a:ext cx="844596" cy="590043"/>
+              </a:xfrm>
+              <a:prstGeom prst="roundRect">
+                <a:avLst/>
+              </a:prstGeom>
+              <a:blipFill>
+                <a:blip r:embed="rId8"/>
+                <a:stretch>
+                  <a:fillRect t="-4124" b="-5155"/>
+                </a:stretch>
+              </a:blipFill>
+              <a:ln>
+                <a:noFill/>
+              </a:ln>
+            </p:spPr>
+            <p:txBody>
+              <a:bodyPr/>
+              <a:lstStyle/>
+              <a:p>
+                <a:r>
+                  <a:rPr lang="en-US">
+                    <a:noFill/>
+                  </a:rPr>
+                  <a:t> </a:t>
+                </a:r>
+              </a:p>
+            </p:txBody>
+          </p:sp>
+        </mc:Fallback>
+      </mc:AlternateContent>
+      <p:sp>
+        <p:nvSpPr>
+          <p:cNvPr id="96" name="TextBox 95">
+            <a:extLst>
+              <a:ext uri="{FF2B5EF4-FFF2-40B4-BE49-F238E27FC236}">
+                <a16:creationId xmlns:a16="http://schemas.microsoft.com/office/drawing/2014/main" id="{84BEF51F-257F-4560-A04C-C845CE7F58B5}"/>
+              </a:ext>
+            </a:extLst>
+          </p:cNvPr>
+          <p:cNvSpPr txBox="1"/>
+          <p:nvPr/>
+        </p:nvSpPr>
+        <p:spPr>
+          <a:xfrm>
+            <a:off x="6194509" y="688029"/>
+            <a:ext cx="512068" cy="338554"/>
+          </a:xfrm>
+          <a:prstGeom prst="rect">
+            <a:avLst/>
+          </a:prstGeom>
+          <a:noFill/>
+        </p:spPr>
+        <p:txBody>
+          <a:bodyPr wrap="square" rtlCol="0">
+            <a:spAutoFit/>
+          </a:bodyPr>
+          <a:lstStyle/>
+          <a:p>
+            <a:r>
+              <a:rPr lang="en-US" sz="800" dirty="0">
+                <a:latin typeface="Helvetica" panose="020B0604020202020204" pitchFamily="34" charset="0"/>
+                <a:cs typeface="Helvetica" panose="020B0604020202020204" pitchFamily="34" charset="0"/>
+              </a:rPr>
+              <a:t>Weight sync</a:t>
             </a:r>
           </a:p>
         </p:txBody>

</xml_diff>